<commit_message>
Spectural Cluster and other stuff
</commit_message>
<xml_diff>
--- a/doc/presentation.pptx
+++ b/doc/presentation.pptx
@@ -4490,28 +4490,45 @@
         </p:nvSpPr>
         <p:spPr>
           <a:xfrm>
-            <a:off x="1183341" y="1387737"/>
-            <a:ext cx="6777318" cy="1660263"/>
+            <a:off x="609600" y="1676400"/>
+            <a:ext cx="8077200" cy="1371600"/>
           </a:xfrm>
         </p:spPr>
         <p:txBody>
           <a:bodyPr>
-            <a:normAutofit fontScale="90000"/>
+            <a:noAutofit/>
           </a:bodyPr>
           <a:lstStyle/>
           <a:p>
             <a:r>
-              <a:rPr lang="en-US" altLang="zh-CN" dirty="0" smtClean="0"/>
-              <a:t>Applied Data Science</a:t>
+              <a:rPr lang="en-US" altLang="zh-CN" sz="5000" dirty="0" smtClean="0"/>
+              <a:t/>
             </a:r>
             <a:br>
-              <a:rPr lang="en-US" altLang="zh-CN" dirty="0" smtClean="0"/>
+              <a:rPr lang="en-US" altLang="zh-CN" sz="5000" dirty="0" smtClean="0"/>
             </a:br>
             <a:r>
-              <a:rPr lang="en-US" altLang="zh-CN" dirty="0" smtClean="0"/>
-              <a:t>Project 4</a:t>
-            </a:r>
-            <a:endParaRPr lang="zh-CN" altLang="en-US" dirty="0"/>
+              <a:rPr lang="en-US" altLang="zh-CN" sz="5000" dirty="0">
+                <a:effectLst/>
+                <a:latin typeface="Times New Roman Uni" panose="02020603050405020304" pitchFamily="18" charset="-122"/>
+                <a:ea typeface="Times New Roman Uni" panose="02020603050405020304" pitchFamily="18" charset="-122"/>
+                <a:cs typeface="Times New Roman Uni" panose="02020603050405020304" pitchFamily="18" charset="-122"/>
+              </a:rPr>
+              <a:t>Entity Resolution </a:t>
+            </a:r>
+            <a:r>
+              <a:rPr lang="en-US" altLang="zh-CN" sz="5000" dirty="0" smtClean="0">
+                <a:latin typeface="Times New Roman Uni" panose="02020603050405020304" pitchFamily="18" charset="-122"/>
+                <a:ea typeface="Times New Roman Uni" panose="02020603050405020304" pitchFamily="18" charset="-122"/>
+                <a:cs typeface="Times New Roman Uni" panose="02020603050405020304" pitchFamily="18" charset="-122"/>
+              </a:rPr>
+              <a:t>Algorithms</a:t>
+            </a:r>
+            <a:endParaRPr lang="zh-CN" altLang="en-US" sz="5000" dirty="0">
+              <a:latin typeface="Times New Roman Uni" panose="02020603050405020304" pitchFamily="18" charset="-122"/>
+              <a:ea typeface="Times New Roman Uni" panose="02020603050405020304" pitchFamily="18" charset="-122"/>
+              <a:cs typeface="Times New Roman Uni" panose="02020603050405020304" pitchFamily="18" charset="-122"/>
+            </a:endParaRPr>
           </a:p>
         </p:txBody>
       </p:sp>

</xml_diff>